<commit_message>
datos ajustados de metricas para carregar no looker
</commit_message>
<xml_diff>
--- a/Febrero - Deck de Metricas.pptx
+++ b/Febrero - Deck de Metricas.pptx
@@ -29382,11 +29382,11 @@
                         </a:defRPr>
                       </a:pPr>
                       <a:r>
-                        <a:t>🟡 7d 9h</a:t>
+                        <a:t>🟡 7d 1h</a:t>
                       </a:r>
                       <a:br/>
                       <a:r>
-                        <a:t> (⬇ + 4h 45m)</a:t>
+                        <a:t> (⬆ - 6h 11m)</a:t>
                       </a:r>
                     </a:p>
                   </a:txBody>
@@ -29436,7 +29436,7 @@
                         </a:defRPr>
                       </a:pPr>
                       <a:r>
-                        <a:t>11 / 5</a:t>
+                        <a:t>13 / 5</a:t>
                       </a:r>
                       <a:br/>
                       <a:r>
@@ -29490,11 +29490,11 @@
                         </a:defRPr>
                       </a:pPr>
                       <a:r>
-                        <a:t>13 / 7</a:t>
+                        <a:t>18 / 8</a:t>
                       </a:r>
                       <a:br/>
                       <a:r>
-                        <a:t> (⬇ + 3.0)</a:t>
+                        <a:t> (⬇ + 5.0)</a:t>
                       </a:r>
                     </a:p>
                   </a:txBody>
@@ -29544,11 +29544,11 @@
                         </a:defRPr>
                       </a:pPr>
                       <a:r>
-                        <a:t>59 (33 - 18 - 8)</a:t>
+                        <a:t>86 (52 - 22 - 12)</a:t>
                       </a:r>
                       <a:br/>
                       <a:r>
-                        <a:t> (⬆ + 1.0)</a:t>
+                        <a:t> (⬆ + 5)</a:t>
                       </a:r>
                     </a:p>
                   </a:txBody>
@@ -29598,11 +29598,11 @@
                         </a:defRPr>
                       </a:pPr>
                       <a:r>
-                        <a:t>81.9% - 12.52% - 5.58%</a:t>
+                        <a:t>67.11% - 24.02% - 8.87%</a:t>
                       </a:r>
                       <a:br/>
                       <a:r>
-                        <a:t> (⬆ - 14.45% / ⬇ + 0.24%)</a:t>
+                        <a:t> (⬆ - 2.98% / ⬇ + 3.52%)</a:t>
                       </a:r>
                     </a:p>
                   </a:txBody>
@@ -29712,11 +29712,11 @@
                         </a:defRPr>
                       </a:pPr>
                       <a:r>
-                        <a:t>🟡 9d 6h</a:t>
+                        <a:t>🟡 9d 16h</a:t>
                       </a:r>
                       <a:br/>
                       <a:r>
-                        <a:t> (⬆ - 4d 18h)</a:t>
+                        <a:t> (⬆ - 4d 8h)</a:t>
                       </a:r>
                     </a:p>
                   </a:txBody>
@@ -29820,11 +29820,11 @@
                         </a:defRPr>
                       </a:pPr>
                       <a:r>
-                        <a:t>6 / 2</a:t>
+                        <a:t>5 / 2</a:t>
                       </a:r>
                       <a:br/>
                       <a:r>
-                        <a:t> (⬇ + 5.0)</a:t>
+                        <a:t> (⬇ + 2.0)</a:t>
                       </a:r>
                     </a:p>
                   </a:txBody>
@@ -29874,11 +29874,11 @@
                         </a:defRPr>
                       </a:pPr>
                       <a:r>
-                        <a:t>77 (54 - 15 - 8)</a:t>
+                        <a:t>100 (71 - 21 - 8)</a:t>
                       </a:r>
                       <a:br/>
                       <a:r>
-                        <a:t> (⬇ - 1.0)</a:t>
+                        <a:t> (⬇ - 1)</a:t>
                       </a:r>
                     </a:p>
                   </a:txBody>
@@ -29928,11 +29928,11 @@
                         </a:defRPr>
                       </a:pPr>
                       <a:r>
-                        <a:t>74.84% - 9.1% - 16.06%</a:t>
+                        <a:t>76.75% - 9.88% - 13.37%</a:t>
                       </a:r>
                       <a:br/>
                       <a:r>
-                        <a:t> (⬆ - 5.39% / ⬇ + 13.78%)</a:t>
+                        <a:t> (⬆ - 4.61% / ⬇ + 11.09%)</a:t>
                       </a:r>
                     </a:p>
                   </a:txBody>
@@ -30042,11 +30042,11 @@
                         </a:defRPr>
                       </a:pPr>
                       <a:r>
-                        <a:t>🔵 5d 4h</a:t>
+                        <a:t>🔵 5d 10h</a:t>
                       </a:r>
                       <a:br/>
                       <a:r>
-                        <a:t> (⬇ + 9h 13m)</a:t>
+                        <a:t> (⬇ + 14h 51m)</a:t>
                       </a:r>
                     </a:p>
                   </a:txBody>
@@ -30096,11 +30096,11 @@
                         </a:defRPr>
                       </a:pPr>
                       <a:r>
-                        <a:t>1 / 0</a:t>
+                        <a:t>2 / 0</a:t>
                       </a:r>
                       <a:br/>
                       <a:r>
-                        <a:t> (⬇ + 1.0)</a:t>
+                        <a:t> (⬇ + 2.0)</a:t>
                       </a:r>
                     </a:p>
                   </a:txBody>
@@ -30150,11 +30150,11 @@
                         </a:defRPr>
                       </a:pPr>
                       <a:r>
-                        <a:t>5 / 0</a:t>
+                        <a:t>4 / 2</a:t>
                       </a:r>
                       <a:br/>
                       <a:r>
-                        <a:t> (⬇ + 5.0)</a:t>
+                        <a:t> (⬇ + 3.0)</a:t>
                       </a:r>
                     </a:p>
                   </a:txBody>
@@ -30204,11 +30204,11 @@
                         </a:defRPr>
                       </a:pPr>
                       <a:r>
-                        <a:t>28 (14 - 8 - 6)</a:t>
+                        <a:t>40 (21 - 13 - 6)</a:t>
                       </a:r>
                       <a:br/>
                       <a:r>
-                        <a:t> (⬆ + 1.0)</a:t>
+                        <a:t> (⬆ + 1)</a:t>
                       </a:r>
                     </a:p>
                   </a:txBody>
@@ -30258,11 +30258,11 @@
                         </a:defRPr>
                       </a:pPr>
                       <a:r>
-                        <a:t>92.2% - 4.73% - 3.07%</a:t>
+                        <a:t>84.87% - 8.36% - 6.77%</a:t>
                       </a:r>
                       <a:br/>
                       <a:r>
-                        <a:t> (⬇ + 2.11% / ⬆ - 12.38%)</a:t>
+                        <a:t> (⬇ + 5.74% / ⬆ - 8.68%)</a:t>
                       </a:r>
                     </a:p>
                   </a:txBody>
@@ -30431,11 +30431,11 @@
                         </a:defRPr>
                       </a:pPr>
                       <a:r>
-                        <a:t>🟢 2d 4h</a:t>
+                        <a:t>🟢 1d 20h</a:t>
                       </a:r>
                       <a:br/>
                       <a:r>
-                        <a:t> (⬆ - 2d 3h)</a:t>
+                        <a:t> (⬆ - 2d 14h)</a:t>
                       </a:r>
                     </a:p>
                   </a:txBody>
@@ -30506,11 +30506,11 @@
                         </a:defRPr>
                       </a:pPr>
                       <a:r>
-                        <a:t>9 / 3</a:t>
+                        <a:t>11 / 3</a:t>
                       </a:r>
                       <a:br/>
                       <a:r>
-                        <a:t> (⬆ - 1.0)</a:t>
+                        <a:t> (⬇ + 1.0)</a:t>
                       </a:r>
                     </a:p>
                   </a:txBody>
@@ -30581,11 +30581,11 @@
                         </a:defRPr>
                       </a:pPr>
                       <a:r>
-                        <a:t>7 / 3</a:t>
+                        <a:t>13 / 3</a:t>
                       </a:r>
                       <a:br/>
                       <a:r>
-                        <a:t> (⬇ + 5.0)</a:t>
+                        <a:t> (⬇ + 11.0)</a:t>
                       </a:r>
                     </a:p>
                   </a:txBody>
@@ -30656,11 +30656,11 @@
                         </a:defRPr>
                       </a:pPr>
                       <a:r>
-                        <a:t>77 (57 - 14 - 6)</a:t>
+                        <a:t>94 (67 - 19 - 8)</a:t>
                       </a:r>
                       <a:br/>
                       <a:r>
-                        <a:t> (⬆ + 5.0)</a:t>
+                        <a:t> (⬆ + 7)</a:t>
                       </a:r>
                     </a:p>
                   </a:txBody>
@@ -30731,11 +30731,11 @@
                         </a:defRPr>
                       </a:pPr>
                       <a:r>
-                        <a:t>94.66% - 3.73% - 1.61%</a:t>
+                        <a:t>91.9% - 4.72% - 3.37%</a:t>
                       </a:r>
                       <a:br/>
                       <a:r>
-                        <a:t> (⬆ - 6.36% / ⬆ - 3.28%)</a:t>
+                        <a:t> (⬆ - 5.62% / ⬆ - 1.07%)</a:t>
                       </a:r>
                     </a:p>
                   </a:txBody>
@@ -30906,11 +30906,11 @@
                         </a:defRPr>
                       </a:pPr>
                       <a:r>
-                        <a:t>🔵 6d</a:t>
+                        <a:t>🟡 10d 23h</a:t>
                       </a:r>
                       <a:br/>
                       <a:r>
-                        <a:t> (⬆ - 4d 7h)</a:t>
+                        <a:t> (⬇ + 15h 52m)</a:t>
                       </a:r>
                     </a:p>
                   </a:txBody>
@@ -31092,11 +31092,11 @@
                         </a:defRPr>
                       </a:pPr>
                       <a:r>
-                        <a:t>45 (33 - 11 - 1)</a:t>
+                        <a:t>61 (40 - 18 - 3)</a:t>
                       </a:r>
                       <a:br/>
                       <a:r>
-                        <a:t> (⬇ - 5.0)</a:t>
+                        <a:t> (⬇ - 3)</a:t>
                       </a:r>
                     </a:p>
                   </a:txBody>
@@ -31154,11 +31154,11 @@
                         </a:defRPr>
                       </a:pPr>
                       <a:r>
-                        <a:t>85.79% - 9.01% - 5.19%</a:t>
+                        <a:t>73.63% - 13.42% - 12.94%</a:t>
                       </a:r>
                       <a:br/>
                       <a:r>
-                        <a:t> (⬆ - 8.81% / ⬇ + 1.22%)</a:t>
+                        <a:t> (⬆ - 4.4% / ⬇ + 8.97%)</a:t>
                       </a:r>
                     </a:p>
                   </a:txBody>
@@ -31292,11 +31292,11 @@
                         </a:defRPr>
                       </a:pPr>
                       <a:r>
-                        <a:t>🟡 9d</a:t>
+                        <a:t>🟡 9d 9h</a:t>
                       </a:r>
                       <a:br/>
                       <a:r>
-                        <a:t> (⬇ + 1d 11h)</a:t>
+                        <a:t> (⬇ + 1d 20h)</a:t>
                       </a:r>
                     </a:p>
                   </a:txBody>
@@ -31454,11 +31454,11 @@
                         </a:defRPr>
                       </a:pPr>
                       <a:r>
-                        <a:t>40 (25 - 12 - 3)</a:t>
+                        <a:t>53 (32 - 16 - 5)</a:t>
                       </a:r>
                       <a:br/>
                       <a:r>
-                        <a:t> (⬇ - 4.0)</a:t>
+                        <a:t> (⬇ - 2)</a:t>
                       </a:r>
                     </a:p>
                   </a:txBody>
@@ -31508,11 +31508,11 @@
                         </a:defRPr>
                       </a:pPr>
                       <a:r>
-                        <a:t>88.98% - 2.52% - 8.5%</a:t>
+                        <a:t>90.68% - 3.97% - 5.35%</a:t>
                       </a:r>
                       <a:br/>
                       <a:r>
-                        <a:t> (⬆ - 9.18% / ⬇ + 2.27%)</a:t>
+                        <a:t> (⬆ - 7.73% / ⬆ - 0.88%)</a:t>
                       </a:r>
                     </a:p>
                   </a:txBody>
@@ -31679,11 +31679,11 @@
                         </a:defRPr>
                       </a:pPr>
                       <a:r>
-                        <a:t>🟢 2d</a:t>
+                        <a:t>🔴 13d 16h</a:t>
                       </a:r>
                       <a:br/>
                       <a:r>
-                        <a:t> (⬇ + 1d)</a:t>
+                        <a:t> (⬇ + 12d 20h)</a:t>
                       </a:r>
                     </a:p>
                   </a:txBody>
@@ -31873,11 +31873,11 @@
                         </a:defRPr>
                       </a:pPr>
                       <a:r>
-                        <a:t>19 (4 - 15 - 0)</a:t>
+                        <a:t>28 (4 - 23 - 1)</a:t>
                       </a:r>
                       <a:br/>
                       <a:r>
-                        <a:t> (=)</a:t>
+                        <a:t> (⬆ + 1)</a:t>
                       </a:r>
                     </a:p>
                   </a:txBody>
@@ -31939,11 +31939,11 @@
                         </a:defRPr>
                       </a:pPr>
                       <a:r>
-                        <a:t>80.18% - 6.15% - 13.68%</a:t>
+                        <a:t>70.84% - 13.48% - 15.68%</a:t>
                       </a:r>
                       <a:br/>
                       <a:r>
-                        <a:t> (⬇ + 0.68% / ⬇ + 7.18%)</a:t>
+                        <a:t> (⬇ + 8.01% / ⬇ + 9.18%)</a:t>
                       </a:r>
                     </a:p>
                   </a:txBody>
@@ -32092,11 +32092,11 @@
                         </a:defRPr>
                       </a:pPr>
                       <a:r>
-                        <a:t>🟡 11d 19h</a:t>
+                        <a:t>🟡 11d 9h</a:t>
                       </a:r>
                       <a:br/>
                       <a:r>
-                        <a:t> (⬆ - 1h 3m)</a:t>
+                        <a:t> (⬆ - 11h 15m)</a:t>
                       </a:r>
                     </a:p>
                   </a:txBody>
@@ -32266,11 +32266,11 @@
                         </a:defRPr>
                       </a:pPr>
                       <a:r>
-                        <a:t>52 (38 - 11 - 3)</a:t>
+                        <a:t>63 (45 - 14 - 4)</a:t>
                       </a:r>
                       <a:br/>
                       <a:r>
-                        <a:t> (⬆ + 1.0)</a:t>
+                        <a:t> (⬆ + 4)</a:t>
                       </a:r>
                     </a:p>
                   </a:txBody>
@@ -32324,11 +32324,11 @@
                         </a:defRPr>
                       </a:pPr>
                       <a:r>
-                        <a:t>76.85% - 15.81% - 7.34%</a:t>
+                        <a:t>75.54% - 18.86% - 5.6%</a:t>
                       </a:r>
                       <a:br/>
                       <a:r>
-                        <a:t> (⬆ - 1.72% / ⬆ - 7.08%)</a:t>
+                        <a:t> (⬇ + 0.69% / ⬆ - 9.3%)</a:t>
                       </a:r>
                     </a:p>
                   </a:txBody>
@@ -32481,11 +32481,11 @@
                         </a:defRPr>
                       </a:pPr>
                       <a:r>
-                        <a:t>🟡 10d 12h</a:t>
+                        <a:t>🟡 9d 10h</a:t>
                       </a:r>
                       <a:br/>
                       <a:r>
-                        <a:t> (⬇ + 1d 18h)</a:t>
+                        <a:t> (⬇ + 15h 59m)</a:t>
                       </a:r>
                     </a:p>
                   </a:txBody>
@@ -32635,11 +32635,11 @@
                         </a:defRPr>
                       </a:pPr>
                       <a:r>
-                        <a:t>20 (10 - 6 - 4)</a:t>
+                        <a:t>31 (15 - 8 - 8)</a:t>
                       </a:r>
                       <a:br/>
                       <a:r>
-                        <a:t> (⬇ - 3.0)</a:t>
+                        <a:t> (⬆ + 1)</a:t>
                       </a:r>
                     </a:p>
                   </a:txBody>
@@ -32685,11 +32685,11 @@
                         </a:defRPr>
                       </a:pPr>
                       <a:r>
-                        <a:t>88.28% - 9.1% - 2.62%</a:t>
+                        <a:t>85.88% - 8.02% - 6.11%</a:t>
                       </a:r>
                       <a:br/>
                       <a:r>
-                        <a:t> (⬆ - 11.17% / ⬇ + 1.52%)</a:t>
+                        <a:t> (⬆ - 12.25% / ⬇ + 5.01%)</a:t>
                       </a:r>
                     </a:p>
                   </a:txBody>

</xml_diff>